<commit_message>
Fix image and report
</commit_message>
<xml_diff>
--- a/spec/presentation/Presentation.pptx
+++ b/spec/presentation/Presentation.pptx
@@ -223,7 +223,7 @@
           <a:p>
             <a:fld id="{4BA666F6-5881-45C2-B1FB-D83BEFCFBA7A}" type="datetimeFigureOut">
               <a:rPr lang="en-US" smtClean="0"/>
-              <a:t>6/21/2020</a:t>
+              <a:t>7/16/2020</a:t>
             </a:fld>
             <a:endParaRPr lang="en-US"/>
           </a:p>
@@ -1148,7 +1148,7 @@
           <a:p>
             <a:fld id="{ED291B17-9318-49DB-B28B-6E5994AE9581}" type="datetime1">
               <a:rPr lang="en-US" smtClean="0"/>
-              <a:t>6/21/2020</a:t>
+              <a:t>7/16/2020</a:t>
             </a:fld>
             <a:endParaRPr lang="en-US" dirty="0"/>
           </a:p>
@@ -1351,7 +1351,7 @@
           <a:p>
             <a:fld id="{2CED4963-E985-44C4-B8C4-FDD613B7C2F8}" type="datetime1">
               <a:rPr lang="en-US" smtClean="0"/>
-              <a:t>6/21/2020</a:t>
+              <a:t>7/16/2020</a:t>
             </a:fld>
             <a:endParaRPr lang="en-US" dirty="0"/>
           </a:p>
@@ -1713,7 +1713,7 @@
           <a:p>
             <a:fld id="{ED291B17-9318-49DB-B28B-6E5994AE9581}" type="datetime1">
               <a:rPr lang="en-US" smtClean="0"/>
-              <a:t>6/21/2020</a:t>
+              <a:t>7/16/2020</a:t>
             </a:fld>
             <a:endParaRPr lang="en-US" dirty="0"/>
           </a:p>
@@ -1911,7 +1911,7 @@
           <a:p>
             <a:fld id="{78DD82B9-B8EE-4375-B6FF-88FA6ABB15D9}" type="datetime1">
               <a:rPr lang="en-US" smtClean="0"/>
-              <a:t>6/21/2020</a:t>
+              <a:t>7/16/2020</a:t>
             </a:fld>
             <a:endParaRPr lang="en-US" dirty="0"/>
           </a:p>
@@ -2223,7 +2223,7 @@
           <a:p>
             <a:fld id="{B2497495-0637-405E-AE64-5CC7506D51F5}" type="datetime1">
               <a:rPr lang="en-US" smtClean="0"/>
-              <a:t>6/21/2020</a:t>
+              <a:t>7/16/2020</a:t>
             </a:fld>
             <a:endParaRPr lang="en-US" dirty="0"/>
           </a:p>
@@ -2476,7 +2476,7 @@
           <a:p>
             <a:fld id="{7BFFD690-9426-415D-8B65-26881E07B2D4}" type="datetime1">
               <a:rPr lang="en-US" smtClean="0"/>
-              <a:t>6/21/2020</a:t>
+              <a:t>7/16/2020</a:t>
             </a:fld>
             <a:endParaRPr lang="en-US" dirty="0"/>
           </a:p>
@@ -2898,7 +2898,7 @@
           <a:p>
             <a:fld id="{04C4989A-474C-40DE-95B9-011C28B71673}" type="datetime1">
               <a:rPr lang="en-US" smtClean="0"/>
-              <a:t>6/21/2020</a:t>
+              <a:t>7/16/2020</a:t>
             </a:fld>
             <a:endParaRPr lang="en-US" dirty="0"/>
           </a:p>
@@ -3021,7 +3021,7 @@
           <a:p>
             <a:fld id="{5DB4ED54-5B5E-4A04-93D3-5772E3CE3818}" type="datetime1">
               <a:rPr lang="en-US" smtClean="0"/>
-              <a:t>6/21/2020</a:t>
+              <a:t>7/16/2020</a:t>
             </a:fld>
             <a:endParaRPr lang="en-US" dirty="0"/>
           </a:p>
@@ -3116,7 +3116,7 @@
           <a:p>
             <a:fld id="{4EDE50D6-574B-40AF-946F-D52A04ADE379}" type="datetime1">
               <a:rPr lang="en-US" smtClean="0"/>
-              <a:t>6/21/2020</a:t>
+              <a:t>7/16/2020</a:t>
             </a:fld>
             <a:endParaRPr lang="en-US" dirty="0"/>
           </a:p>
@@ -3493,7 +3493,7 @@
           <a:p>
             <a:fld id="{D82884F1-FFEA-405F-9602-3DCA865EDA4E}" type="datetime1">
               <a:rPr lang="en-US" smtClean="0"/>
-              <a:t>6/21/2020</a:t>
+              <a:t>7/16/2020</a:t>
             </a:fld>
             <a:endParaRPr lang="en-US" dirty="0"/>
           </a:p>
@@ -3786,7 +3786,7 @@
           <a:p>
             <a:fld id="{7E18DB4A-8810-4A10-AD5C-D5E2C667F5B3}" type="datetime1">
               <a:rPr lang="en-US" smtClean="0"/>
-              <a:t>6/21/2020</a:t>
+              <a:t>7/16/2020</a:t>
             </a:fld>
             <a:endParaRPr lang="en-US" dirty="0"/>
           </a:p>
@@ -4004,7 +4004,7 @@
           <a:p>
             <a:fld id="{ED291B17-9318-49DB-B28B-6E5994AE9581}" type="datetime1">
               <a:rPr lang="en-US" smtClean="0"/>
-              <a:t>6/21/2020</a:t>
+              <a:t>7/16/2020</a:t>
             </a:fld>
             <a:endParaRPr lang="en-US" dirty="0"/>
           </a:p>
@@ -4838,7 +4838,7 @@
               <a:t>systems,</a:t>
             </a:r>
             <a:br>
-              <a:rPr lang="en-US" sz="6000" b="1" cap="none" dirty="0">
+              <a:rPr lang="en-US" sz="6000" b="1" cap="none">
                 <a:ln w="12700">
                   <a:solidFill>
                     <a:schemeClr val="accent3">
@@ -4860,7 +4860,7 @@
               </a:rPr>
             </a:br>
             <a:r>
-              <a:rPr lang="en-US" sz="3100" b="1" cap="none" dirty="0">
+              <a:rPr lang="en-US" sz="3100" b="1" cap="none">
                 <a:ln w="12700">
                   <a:solidFill>
                     <a:schemeClr val="accent3">
@@ -4880,7 +4880,7 @@
                   </a:innerShdw>
                 </a:effectLst>
               </a:rPr>
-              <a:t>COMP411</a:t>
+              <a:t>COMP414</a:t>
             </a:r>
             <a:br>
               <a:rPr lang="en-US" sz="9600" dirty="0">

</xml_diff>